<commit_message>
Create Spring Data Repository
</commit_message>
<xml_diff>
--- a/15_Ch27_AddSpringData.pptx
+++ b/15_Ch27_AddSpringData.pptx
@@ -3636,7 +3636,7 @@
                   <a:srgbClr val="FFFF00"/>
                 </a:solidFill>
               </a:rPr>
-              <a:t>27 Add Spring Data</a:t>
+              <a:t>27 Add Spring Data JSP</a:t>
             </a:r>
             <a:endParaRPr lang="zh-TW" altLang="en-US" sz="4800" b="1" dirty="0">
               <a:solidFill>
@@ -3902,7 +3902,7 @@
                   <a:srgbClr val="FFFF00"/>
                 </a:solidFill>
               </a:rPr>
-              <a:t>27 Add Spring Data</a:t>
+              <a:t>27 Add Spring Data JSP</a:t>
             </a:r>
             <a:endParaRPr lang="zh-TW" altLang="en-US" b="1" dirty="0">
               <a:solidFill>
@@ -3972,16 +3972,7 @@
                 </a:solidFill>
                 <a:latin typeface="+mj-lt"/>
               </a:rPr>
-              <a:t> </a:t>
-            </a:r>
-            <a:r>
-              <a:rPr lang="en-US" altLang="zh-TW" sz="1600" b="1" dirty="0" smtClean="0">
-                <a:solidFill>
-                  <a:schemeClr val="tx1"/>
-                </a:solidFill>
-                <a:latin typeface="+mj-lt"/>
-              </a:rPr>
-              <a:t>into project-</a:t>
+              <a:t> into project-</a:t>
             </a:r>
             <a:r>
               <a:rPr lang="en-US" altLang="zh-TW" sz="1600" b="1" dirty="0" err="1" smtClean="0">
@@ -4001,12 +3992,6 @@
               </a:rPr>
               <a:t>-data</a:t>
             </a:r>
-            <a:endParaRPr lang="en-US" altLang="zh-TW" sz="1600" b="1" dirty="0" smtClean="0">
-              <a:solidFill>
-                <a:schemeClr val="tx1"/>
-              </a:solidFill>
-              <a:latin typeface="+mj-lt"/>
-            </a:endParaRPr>
           </a:p>
         </p:txBody>
       </p:sp>
@@ -4426,11 +4411,6 @@
               </a:rPr>
               <a:t>/java folder  </a:t>
             </a:r>
-            <a:endParaRPr lang="en-US" altLang="zh-TW" b="1" dirty="0" smtClean="0">
-              <a:solidFill>
-                <a:schemeClr val="tx1"/>
-              </a:solidFill>
-            </a:endParaRPr>
           </a:p>
           <a:p>
             <a:r>
@@ -4627,7 +4607,7 @@
                   <a:srgbClr val="FFFF00"/>
                 </a:solidFill>
               </a:rPr>
-              <a:t>27 Add Spring Data</a:t>
+              <a:t>27 Add Spring Data JSP</a:t>
             </a:r>
             <a:endParaRPr lang="zh-TW" altLang="en-US" b="1" dirty="0">
               <a:solidFill>
@@ -5031,7 +5011,7 @@
                   <a:srgbClr val="FFFF00"/>
                 </a:solidFill>
               </a:rPr>
-              <a:t>27 Add Spring Data</a:t>
+              <a:t>27 Add Spring Data JSP</a:t>
             </a:r>
             <a:endParaRPr lang="zh-TW" altLang="en-US" b="1" dirty="0">
               <a:solidFill>
@@ -5104,12 +5084,6 @@
               </a:rPr>
               <a:t>Open Postman and GET “localhost:8080/topics”</a:t>
             </a:r>
-            <a:endParaRPr lang="en-US" altLang="zh-TW" sz="1600" b="1" dirty="0" smtClean="0">
-              <a:solidFill>
-                <a:schemeClr val="tx1"/>
-              </a:solidFill>
-              <a:latin typeface="+mj-lt"/>
-            </a:endParaRPr>
           </a:p>
         </p:txBody>
       </p:sp>
@@ -5707,7 +5681,7 @@
                   <a:srgbClr val="FFFF00"/>
                 </a:solidFill>
               </a:rPr>
-              <a:t>27 Add Spring Data</a:t>
+              <a:t>27 Add Spring Data JSP</a:t>
             </a:r>
             <a:endParaRPr lang="zh-TW" altLang="en-US" b="1" dirty="0">
               <a:solidFill>
@@ -5991,7 +5965,7 @@
                   <a:srgbClr val="FFFF00"/>
                 </a:solidFill>
               </a:rPr>
-              <a:t>27 Add Spring Data</a:t>
+              <a:t>27 Add Spring Data JSP</a:t>
             </a:r>
             <a:endParaRPr lang="zh-TW" altLang="en-US" b="1" dirty="0">
               <a:solidFill>
@@ -6370,7 +6344,7 @@
                   <a:srgbClr val="FFFF00"/>
                 </a:solidFill>
               </a:rPr>
-              <a:t>27 Add Spring Data</a:t>
+              <a:t>27 Add Spring Data JSP</a:t>
             </a:r>
             <a:endParaRPr lang="zh-TW" altLang="en-US" b="1" dirty="0">
               <a:solidFill>
@@ -6796,7 +6770,7 @@
                   <a:srgbClr val="FFFF00"/>
                 </a:solidFill>
               </a:rPr>
-              <a:t>27 Add Spring Data</a:t>
+              <a:t>27 Add Spring Data JSP</a:t>
             </a:r>
             <a:endParaRPr lang="zh-TW" altLang="en-US" b="1" dirty="0">
               <a:solidFill>
@@ -7080,7 +7054,7 @@
                   <a:srgbClr val="FFFF00"/>
                 </a:solidFill>
               </a:rPr>
-              <a:t>27 Add Spring Data</a:t>
+              <a:t>27 Add Spring Data JSP</a:t>
             </a:r>
             <a:endParaRPr lang="zh-TW" altLang="en-US" b="1" dirty="0">
               <a:solidFill>
@@ -7134,12 +7108,6 @@
               </a:rPr>
               <a:t>Click SQL. </a:t>
             </a:r>
-            <a:endParaRPr lang="en-US" altLang="zh-TW" sz="1600" b="1" dirty="0" smtClean="0">
-              <a:solidFill>
-                <a:schemeClr val="tx1"/>
-              </a:solidFill>
-              <a:latin typeface="+mj-lt"/>
-            </a:endParaRPr>
           </a:p>
           <a:p>
             <a:pPr marL="342900" indent="-342900" algn="l">
@@ -7490,7 +7458,7 @@
                   <a:srgbClr val="FFFF00"/>
                 </a:solidFill>
               </a:rPr>
-              <a:t>27 Add Spring Data</a:t>
+              <a:t>27 Add Spring Data JSP</a:t>
             </a:r>
             <a:endParaRPr lang="zh-TW" altLang="en-US" b="1" dirty="0">
               <a:solidFill>
@@ -7993,7 +7961,7 @@
                   <a:srgbClr val="FFFF00"/>
                 </a:solidFill>
               </a:rPr>
-              <a:t>27 Add Spring Data</a:t>
+              <a:t>27 Add Spring Data JSP</a:t>
             </a:r>
             <a:endParaRPr lang="zh-TW" altLang="en-US" b="1" dirty="0">
               <a:solidFill>
@@ -8045,34 +8013,7 @@
                 </a:solidFill>
                 <a:latin typeface="+mj-lt"/>
               </a:rPr>
-              <a:t>Check the pom.xml, we have Spring Data JPA and Apache Derby </a:t>
-            </a:r>
-            <a:r>
-              <a:rPr lang="en-US" altLang="zh-TW" sz="1600" b="1" dirty="0" smtClean="0">
-                <a:solidFill>
-                  <a:schemeClr val="tx1"/>
-                </a:solidFill>
-                <a:latin typeface="+mj-lt"/>
-              </a:rPr>
-              <a:t>E</a:t>
-            </a:r>
-            <a:r>
-              <a:rPr lang="en-US" altLang="zh-TW" sz="1600" b="1" dirty="0" smtClean="0">
-                <a:solidFill>
-                  <a:schemeClr val="tx1"/>
-                </a:solidFill>
-                <a:latin typeface="+mj-lt"/>
-              </a:rPr>
-              <a:t>mbedded Database</a:t>
-            </a:r>
-            <a:r>
-              <a:rPr lang="en-US" altLang="zh-TW" sz="1600" b="1" dirty="0" smtClean="0">
-                <a:solidFill>
-                  <a:schemeClr val="tx1"/>
-                </a:solidFill>
-                <a:latin typeface="+mj-lt"/>
-              </a:rPr>
-              <a:t>.</a:t>
+              <a:t>Check the pom.xml, we have Spring Data JPA and Apache Derby Embedded Database.</a:t>
             </a:r>
           </a:p>
         </p:txBody>
@@ -8396,7 +8337,7 @@
                   <a:srgbClr val="FFFF00"/>
                 </a:solidFill>
               </a:rPr>
-              <a:t>27 Add Spring Data</a:t>
+              <a:t>27 Add Spring Data JSP</a:t>
             </a:r>
             <a:endParaRPr lang="zh-TW" altLang="en-US" b="1" dirty="0">
               <a:solidFill>

</xml_diff>